<commit_message>
Fixed Pluto LED blink, updated neptune reverb mode, updated infographics
</commit_message>
<xml_diff>
--- a/software/images/Infographics.pptx
+++ b/software/images/Infographics.pptx
@@ -116,27 +116,58 @@
 </p:presentation>
 </file>
 
+<file path=ppt/revisionInfo.xml><?xml version="1.0" encoding="utf-8"?>
+<p1510:revInfo xmlns:a="http://schemas.openxmlformats.org/drawingml/2006/main" xmlns:r="http://schemas.openxmlformats.org/officeDocument/2006/relationships" xmlns:p1510="http://schemas.microsoft.com/office/powerpoint/2015/10/main">
+  <p1510:revLst>
+    <p1510:client id="{24D81073-3E66-491E-88CB-7DBD340A974C}" v="1" dt="2024-06-23T14:00:39.765"/>
+  </p1510:revLst>
+</p1510:revInfo>
+</file>
+
 <file path=ppt/changesInfos/changesInfo1.xml><?xml version="1.0" encoding="utf-8"?>
 <pc:chgInfo xmlns:a="http://schemas.openxmlformats.org/drawingml/2006/main" xmlns:r="http://schemas.openxmlformats.org/officeDocument/2006/relationships" xmlns:ac="http://schemas.microsoft.com/office/drawing/2013/main/command" xmlns:pc="http://schemas.microsoft.com/office/powerpoint/2013/main/command">
   <pc:docChgLst>
     <pc:chgData name="Rachel Bloemer" userId="77b46c2fcbe54245" providerId="LiveId" clId="{24D81073-3E66-491E-88CB-7DBD340A974C}"/>
     <pc:docChg chg="modSld">
-      <pc:chgData name="Rachel Bloemer" userId="77b46c2fcbe54245" providerId="LiveId" clId="{24D81073-3E66-491E-88CB-7DBD340A974C}" dt="2024-06-20T23:02:13.296" v="1" actId="20577"/>
+      <pc:chgData name="Rachel Bloemer" userId="77b46c2fcbe54245" providerId="LiveId" clId="{24D81073-3E66-491E-88CB-7DBD340A974C}" dt="2024-06-23T14:00:51.210" v="7" actId="1076"/>
       <pc:docMkLst>
         <pc:docMk/>
       </pc:docMkLst>
       <pc:sldChg chg="modSp mod">
-        <pc:chgData name="Rachel Bloemer" userId="77b46c2fcbe54245" providerId="LiveId" clId="{24D81073-3E66-491E-88CB-7DBD340A974C}" dt="2024-06-20T23:02:13.296" v="1" actId="20577"/>
+        <pc:chgData name="Rachel Bloemer" userId="77b46c2fcbe54245" providerId="LiveId" clId="{24D81073-3E66-491E-88CB-7DBD340A974C}" dt="2024-06-23T14:00:33.388" v="4" actId="20577"/>
         <pc:sldMkLst>
           <pc:docMk/>
           <pc:sldMk cId="2542036424" sldId="258"/>
         </pc:sldMkLst>
+        <pc:spChg chg="mod">
+          <ac:chgData name="Rachel Bloemer" userId="77b46c2fcbe54245" providerId="LiveId" clId="{24D81073-3E66-491E-88CB-7DBD340A974C}" dt="2024-06-23T14:00:33.388" v="4" actId="20577"/>
+          <ac:spMkLst>
+            <pc:docMk/>
+            <pc:sldMk cId="2542036424" sldId="258"/>
+            <ac:spMk id="33" creationId="{00000000-0000-0000-0000-000000000000}"/>
+          </ac:spMkLst>
+        </pc:spChg>
         <pc:spChg chg="mod">
           <ac:chgData name="Rachel Bloemer" userId="77b46c2fcbe54245" providerId="LiveId" clId="{24D81073-3E66-491E-88CB-7DBD340A974C}" dt="2024-06-20T23:02:13.296" v="1" actId="20577"/>
           <ac:spMkLst>
             <pc:docMk/>
             <pc:sldMk cId="2542036424" sldId="258"/>
             <ac:spMk id="64" creationId="{00000000-0000-0000-0000-000000000000}"/>
+          </ac:spMkLst>
+        </pc:spChg>
+      </pc:sldChg>
+      <pc:sldChg chg="addSp modSp mod">
+        <pc:chgData name="Rachel Bloemer" userId="77b46c2fcbe54245" providerId="LiveId" clId="{24D81073-3E66-491E-88CB-7DBD340A974C}" dt="2024-06-23T14:00:51.210" v="7" actId="1076"/>
+        <pc:sldMkLst>
+          <pc:docMk/>
+          <pc:sldMk cId="1612069438" sldId="259"/>
+        </pc:sldMkLst>
+        <pc:spChg chg="add mod">
+          <ac:chgData name="Rachel Bloemer" userId="77b46c2fcbe54245" providerId="LiveId" clId="{24D81073-3E66-491E-88CB-7DBD340A974C}" dt="2024-06-23T14:00:51.210" v="7" actId="1076"/>
+          <ac:spMkLst>
+            <pc:docMk/>
+            <pc:sldMk cId="1612069438" sldId="259"/>
+            <ac:spMk id="45" creationId="{3AED030E-BFED-3B45-051E-470C3F586D7C}"/>
           </ac:spMkLst>
         </pc:spChg>
       </pc:sldChg>
@@ -274,7 +305,7 @@
           <a:p>
             <a:fld id="{E65F16E8-9810-4F67-B618-098E0E399057}" type="datetimeFigureOut">
               <a:rPr lang="en-US" smtClean="0"/>
-              <a:t>6/20/2024</a:t>
+              <a:t>6/23/2024</a:t>
             </a:fld>
             <a:endParaRPr lang="en-US"/>
           </a:p>
@@ -442,7 +473,7 @@
           <a:p>
             <a:fld id="{E65F16E8-9810-4F67-B618-098E0E399057}" type="datetimeFigureOut">
               <a:rPr lang="en-US" smtClean="0"/>
-              <a:t>6/20/2024</a:t>
+              <a:t>6/23/2024</a:t>
             </a:fld>
             <a:endParaRPr lang="en-US"/>
           </a:p>
@@ -620,7 +651,7 @@
           <a:p>
             <a:fld id="{E65F16E8-9810-4F67-B618-098E0E399057}" type="datetimeFigureOut">
               <a:rPr lang="en-US" smtClean="0"/>
-              <a:t>6/20/2024</a:t>
+              <a:t>6/23/2024</a:t>
             </a:fld>
             <a:endParaRPr lang="en-US"/>
           </a:p>
@@ -788,7 +819,7 @@
           <a:p>
             <a:fld id="{E65F16E8-9810-4F67-B618-098E0E399057}" type="datetimeFigureOut">
               <a:rPr lang="en-US" smtClean="0"/>
-              <a:t>6/20/2024</a:t>
+              <a:t>6/23/2024</a:t>
             </a:fld>
             <a:endParaRPr lang="en-US"/>
           </a:p>
@@ -1033,7 +1064,7 @@
           <a:p>
             <a:fld id="{E65F16E8-9810-4F67-B618-098E0E399057}" type="datetimeFigureOut">
               <a:rPr lang="en-US" smtClean="0"/>
-              <a:t>6/20/2024</a:t>
+              <a:t>6/23/2024</a:t>
             </a:fld>
             <a:endParaRPr lang="en-US"/>
           </a:p>
@@ -1262,7 +1293,7 @@
           <a:p>
             <a:fld id="{E65F16E8-9810-4F67-B618-098E0E399057}" type="datetimeFigureOut">
               <a:rPr lang="en-US" smtClean="0"/>
-              <a:t>6/20/2024</a:t>
+              <a:t>6/23/2024</a:t>
             </a:fld>
             <a:endParaRPr lang="en-US"/>
           </a:p>
@@ -1626,7 +1657,7 @@
           <a:p>
             <a:fld id="{E65F16E8-9810-4F67-B618-098E0E399057}" type="datetimeFigureOut">
               <a:rPr lang="en-US" smtClean="0"/>
-              <a:t>6/20/2024</a:t>
+              <a:t>6/23/2024</a:t>
             </a:fld>
             <a:endParaRPr lang="en-US"/>
           </a:p>
@@ -1743,7 +1774,7 @@
           <a:p>
             <a:fld id="{E65F16E8-9810-4F67-B618-098E0E399057}" type="datetimeFigureOut">
               <a:rPr lang="en-US" smtClean="0"/>
-              <a:t>6/20/2024</a:t>
+              <a:t>6/23/2024</a:t>
             </a:fld>
             <a:endParaRPr lang="en-US"/>
           </a:p>
@@ -1838,7 +1869,7 @@
           <a:p>
             <a:fld id="{E65F16E8-9810-4F67-B618-098E0E399057}" type="datetimeFigureOut">
               <a:rPr lang="en-US" smtClean="0"/>
-              <a:t>6/20/2024</a:t>
+              <a:t>6/23/2024</a:t>
             </a:fld>
             <a:endParaRPr lang="en-US"/>
           </a:p>
@@ -2113,7 +2144,7 @@
           <a:p>
             <a:fld id="{E65F16E8-9810-4F67-B618-098E0E399057}" type="datetimeFigureOut">
               <a:rPr lang="en-US" smtClean="0"/>
-              <a:t>6/20/2024</a:t>
+              <a:t>6/23/2024</a:t>
             </a:fld>
             <a:endParaRPr lang="en-US"/>
           </a:p>
@@ -2365,7 +2396,7 @@
           <a:p>
             <a:fld id="{E65F16E8-9810-4F67-B618-098E0E399057}" type="datetimeFigureOut">
               <a:rPr lang="en-US" smtClean="0"/>
-              <a:t>6/20/2024</a:t>
+              <a:t>6/23/2024</a:t>
             </a:fld>
             <a:endParaRPr lang="en-US"/>
           </a:p>
@@ -2576,7 +2607,7 @@
           <a:p>
             <a:fld id="{E65F16E8-9810-4F67-B618-098E0E399057}" type="datetimeFigureOut">
               <a:rPr lang="en-US" smtClean="0"/>
-              <a:t>6/20/2024</a:t>
+              <a:t>6/23/2024</a:t>
             </a:fld>
             <a:endParaRPr lang="en-US"/>
           </a:p>
@@ -10395,8 +10426,8 @@
         </p:nvSpPr>
         <p:spPr>
           <a:xfrm>
-            <a:off x="4702728" y="5587506"/>
-            <a:ext cx="974947" cy="246221"/>
+            <a:off x="4870242" y="5587506"/>
+            <a:ext cx="639919" cy="246221"/>
           </a:xfrm>
           <a:prstGeom prst="rect">
             <a:avLst/>
@@ -10415,7 +10446,7 @@
                 <a:latin typeface="Century Gothic" panose="020B0502020202020204" pitchFamily="34" charset="0"/>
                 <a:cs typeface="Adobe Devanagari" panose="02040503050201020203" pitchFamily="18" charset="0"/>
               </a:rPr>
-              <a:t>BYPASS / ALT</a:t>
+              <a:t>BYPASS</a:t>
             </a:r>
           </a:p>
         </p:txBody>
@@ -15336,6 +15367,53 @@
           </a:effectRef>
           <a:fontRef idx="minor">
             <a:schemeClr val="dk1"/>
+          </a:fontRef>
+        </p:style>
+        <p:txBody>
+          <a:bodyPr rtlCol="0" anchor="ctr"/>
+          <a:lstStyle/>
+          <a:p>
+            <a:pPr algn="ctr"/>
+            <a:endParaRPr lang="en-US"/>
+          </a:p>
+        </p:txBody>
+      </p:sp>
+      <p:sp>
+        <p:nvSpPr>
+          <p:cNvPr id="45" name="Rectangle 44">
+            <a:extLst>
+              <a:ext uri="{FF2B5EF4-FFF2-40B4-BE49-F238E27FC236}">
+                <a16:creationId xmlns:a16="http://schemas.microsoft.com/office/drawing/2014/main" id="{3AED030E-BFED-3B45-051E-470C3F586D7C}"/>
+              </a:ext>
+            </a:extLst>
+          </p:cNvPr>
+          <p:cNvSpPr/>
+          <p:nvPr/>
+        </p:nvSpPr>
+        <p:spPr>
+          <a:xfrm>
+            <a:off x="4769132" y="1648888"/>
+            <a:ext cx="778693" cy="1864597"/>
+          </a:xfrm>
+          <a:prstGeom prst="rect">
+            <a:avLst/>
+          </a:prstGeom>
+          <a:noFill/>
+        </p:spPr>
+        <p:style>
+          <a:lnRef idx="2">
+            <a:schemeClr val="dk1">
+              <a:shade val="50000"/>
+            </a:schemeClr>
+          </a:lnRef>
+          <a:fillRef idx="1">
+            <a:schemeClr val="dk1"/>
+          </a:fillRef>
+          <a:effectRef idx="0">
+            <a:schemeClr val="dk1"/>
+          </a:effectRef>
+          <a:fontRef idx="minor">
+            <a:schemeClr val="lt1"/>
           </a:fontRef>
         </p:style>
         <p:txBody>

</xml_diff>

<commit_message>
Updated Jupiter readme and infographic
</commit_message>
<xml_diff>
--- a/software/images/Infographics.pptx
+++ b/software/images/Infographics.pptx
@@ -129,12 +129,12 @@
   <pc:docChgLst>
     <pc:chgData name="Rachel Bloemer" userId="77b46c2fcbe54245" providerId="LiveId" clId="{24D81073-3E66-491E-88CB-7DBD340A974C}"/>
     <pc:docChg chg="modSld">
-      <pc:chgData name="Rachel Bloemer" userId="77b46c2fcbe54245" providerId="LiveId" clId="{24D81073-3E66-491E-88CB-7DBD340A974C}" dt="2024-06-23T14:00:51.210" v="7" actId="1076"/>
+      <pc:chgData name="Rachel Bloemer" userId="77b46c2fcbe54245" providerId="LiveId" clId="{24D81073-3E66-491E-88CB-7DBD340A974C}" dt="2024-06-25T01:16:22.725" v="28" actId="20577"/>
       <pc:docMkLst>
         <pc:docMk/>
       </pc:docMkLst>
       <pc:sldChg chg="modSp mod">
-        <pc:chgData name="Rachel Bloemer" userId="77b46c2fcbe54245" providerId="LiveId" clId="{24D81073-3E66-491E-88CB-7DBD340A974C}" dt="2024-06-23T14:00:33.388" v="4" actId="20577"/>
+        <pc:chgData name="Rachel Bloemer" userId="77b46c2fcbe54245" providerId="LiveId" clId="{24D81073-3E66-491E-88CB-7DBD340A974C}" dt="2024-06-25T01:16:22.725" v="28" actId="20577"/>
         <pc:sldMkLst>
           <pc:docMk/>
           <pc:sldMk cId="2542036424" sldId="258"/>
@@ -148,7 +148,7 @@
           </ac:spMkLst>
         </pc:spChg>
         <pc:spChg chg="mod">
-          <ac:chgData name="Rachel Bloemer" userId="77b46c2fcbe54245" providerId="LiveId" clId="{24D81073-3E66-491E-88CB-7DBD340A974C}" dt="2024-06-20T23:02:13.296" v="1" actId="20577"/>
+          <ac:chgData name="Rachel Bloemer" userId="77b46c2fcbe54245" providerId="LiveId" clId="{24D81073-3E66-491E-88CB-7DBD340A974C}" dt="2024-06-25T01:16:22.725" v="28" actId="20577"/>
           <ac:spMkLst>
             <pc:docMk/>
             <pc:sldMk cId="2542036424" sldId="258"/>
@@ -305,7 +305,7 @@
           <a:p>
             <a:fld id="{E65F16E8-9810-4F67-B618-098E0E399057}" type="datetimeFigureOut">
               <a:rPr lang="en-US" smtClean="0"/>
-              <a:t>6/23/2024</a:t>
+              <a:t>6/24/2024</a:t>
             </a:fld>
             <a:endParaRPr lang="en-US"/>
           </a:p>
@@ -473,7 +473,7 @@
           <a:p>
             <a:fld id="{E65F16E8-9810-4F67-B618-098E0E399057}" type="datetimeFigureOut">
               <a:rPr lang="en-US" smtClean="0"/>
-              <a:t>6/23/2024</a:t>
+              <a:t>6/24/2024</a:t>
             </a:fld>
             <a:endParaRPr lang="en-US"/>
           </a:p>
@@ -651,7 +651,7 @@
           <a:p>
             <a:fld id="{E65F16E8-9810-4F67-B618-098E0E399057}" type="datetimeFigureOut">
               <a:rPr lang="en-US" smtClean="0"/>
-              <a:t>6/23/2024</a:t>
+              <a:t>6/24/2024</a:t>
             </a:fld>
             <a:endParaRPr lang="en-US"/>
           </a:p>
@@ -819,7 +819,7 @@
           <a:p>
             <a:fld id="{E65F16E8-9810-4F67-B618-098E0E399057}" type="datetimeFigureOut">
               <a:rPr lang="en-US" smtClean="0"/>
-              <a:t>6/23/2024</a:t>
+              <a:t>6/24/2024</a:t>
             </a:fld>
             <a:endParaRPr lang="en-US"/>
           </a:p>
@@ -1064,7 +1064,7 @@
           <a:p>
             <a:fld id="{E65F16E8-9810-4F67-B618-098E0E399057}" type="datetimeFigureOut">
               <a:rPr lang="en-US" smtClean="0"/>
-              <a:t>6/23/2024</a:t>
+              <a:t>6/24/2024</a:t>
             </a:fld>
             <a:endParaRPr lang="en-US"/>
           </a:p>
@@ -1293,7 +1293,7 @@
           <a:p>
             <a:fld id="{E65F16E8-9810-4F67-B618-098E0E399057}" type="datetimeFigureOut">
               <a:rPr lang="en-US" smtClean="0"/>
-              <a:t>6/23/2024</a:t>
+              <a:t>6/24/2024</a:t>
             </a:fld>
             <a:endParaRPr lang="en-US"/>
           </a:p>
@@ -1657,7 +1657,7 @@
           <a:p>
             <a:fld id="{E65F16E8-9810-4F67-B618-098E0E399057}" type="datetimeFigureOut">
               <a:rPr lang="en-US" smtClean="0"/>
-              <a:t>6/23/2024</a:t>
+              <a:t>6/24/2024</a:t>
             </a:fld>
             <a:endParaRPr lang="en-US"/>
           </a:p>
@@ -1774,7 +1774,7 @@
           <a:p>
             <a:fld id="{E65F16E8-9810-4F67-B618-098E0E399057}" type="datetimeFigureOut">
               <a:rPr lang="en-US" smtClean="0"/>
-              <a:t>6/23/2024</a:t>
+              <a:t>6/24/2024</a:t>
             </a:fld>
             <a:endParaRPr lang="en-US"/>
           </a:p>
@@ -1869,7 +1869,7 @@
           <a:p>
             <a:fld id="{E65F16E8-9810-4F67-B618-098E0E399057}" type="datetimeFigureOut">
               <a:rPr lang="en-US" smtClean="0"/>
-              <a:t>6/23/2024</a:t>
+              <a:t>6/24/2024</a:t>
             </a:fld>
             <a:endParaRPr lang="en-US"/>
           </a:p>
@@ -2144,7 +2144,7 @@
           <a:p>
             <a:fld id="{E65F16E8-9810-4F67-B618-098E0E399057}" type="datetimeFigureOut">
               <a:rPr lang="en-US" smtClean="0"/>
-              <a:t>6/23/2024</a:t>
+              <a:t>6/24/2024</a:t>
             </a:fld>
             <a:endParaRPr lang="en-US"/>
           </a:p>
@@ -2396,7 +2396,7 @@
           <a:p>
             <a:fld id="{E65F16E8-9810-4F67-B618-098E0E399057}" type="datetimeFigureOut">
               <a:rPr lang="en-US" smtClean="0"/>
-              <a:t>6/23/2024</a:t>
+              <a:t>6/24/2024</a:t>
             </a:fld>
             <a:endParaRPr lang="en-US"/>
           </a:p>
@@ -2607,7 +2607,7 @@
           <a:p>
             <a:fld id="{E65F16E8-9810-4F67-B618-098E0E399057}" type="datetimeFigureOut">
               <a:rPr lang="en-US" smtClean="0"/>
-              <a:t>6/23/2024</a:t>
+              <a:t>6/24/2024</a:t>
             </a:fld>
             <a:endParaRPr lang="en-US"/>
           </a:p>
@@ -11755,7 +11755,7 @@
                   <a:schemeClr val="tx1"/>
                 </a:solidFill>
               </a:rPr>
-              <a:t>: NO</a:t>
+              <a:t>: YES</a:t>
             </a:r>
             <a:endParaRPr lang="en-US" sz="1600" b="1" dirty="0">
               <a:solidFill>

</xml_diff>

<commit_message>
Code cleanup, readme updates, infographic updates
</commit_message>
<xml_diff>
--- a/software/images/Infographics.pptx
+++ b/software/images/Infographics.pptx
@@ -373,7 +373,7 @@
           <a:p>
             <a:fld id="{E65F16E8-9810-4F67-B618-098E0E399057}" type="datetimeFigureOut">
               <a:rPr lang="en-US" smtClean="0"/>
-              <a:t>2/11/2025</a:t>
+              <a:t>2/12/2025</a:t>
             </a:fld>
             <a:endParaRPr lang="en-US"/>
           </a:p>
@@ -541,7 +541,7 @@
           <a:p>
             <a:fld id="{E65F16E8-9810-4F67-B618-098E0E399057}" type="datetimeFigureOut">
               <a:rPr lang="en-US" smtClean="0"/>
-              <a:t>2/11/2025</a:t>
+              <a:t>2/12/2025</a:t>
             </a:fld>
             <a:endParaRPr lang="en-US"/>
           </a:p>
@@ -719,7 +719,7 @@
           <a:p>
             <a:fld id="{E65F16E8-9810-4F67-B618-098E0E399057}" type="datetimeFigureOut">
               <a:rPr lang="en-US" smtClean="0"/>
-              <a:t>2/11/2025</a:t>
+              <a:t>2/12/2025</a:t>
             </a:fld>
             <a:endParaRPr lang="en-US"/>
           </a:p>
@@ -887,7 +887,7 @@
           <a:p>
             <a:fld id="{E65F16E8-9810-4F67-B618-098E0E399057}" type="datetimeFigureOut">
               <a:rPr lang="en-US" smtClean="0"/>
-              <a:t>2/11/2025</a:t>
+              <a:t>2/12/2025</a:t>
             </a:fld>
             <a:endParaRPr lang="en-US"/>
           </a:p>
@@ -1132,7 +1132,7 @@
           <a:p>
             <a:fld id="{E65F16E8-9810-4F67-B618-098E0E399057}" type="datetimeFigureOut">
               <a:rPr lang="en-US" smtClean="0"/>
-              <a:t>2/11/2025</a:t>
+              <a:t>2/12/2025</a:t>
             </a:fld>
             <a:endParaRPr lang="en-US"/>
           </a:p>
@@ -1361,7 +1361,7 @@
           <a:p>
             <a:fld id="{E65F16E8-9810-4F67-B618-098E0E399057}" type="datetimeFigureOut">
               <a:rPr lang="en-US" smtClean="0"/>
-              <a:t>2/11/2025</a:t>
+              <a:t>2/12/2025</a:t>
             </a:fld>
             <a:endParaRPr lang="en-US"/>
           </a:p>
@@ -1725,7 +1725,7 @@
           <a:p>
             <a:fld id="{E65F16E8-9810-4F67-B618-098E0E399057}" type="datetimeFigureOut">
               <a:rPr lang="en-US" smtClean="0"/>
-              <a:t>2/11/2025</a:t>
+              <a:t>2/12/2025</a:t>
             </a:fld>
             <a:endParaRPr lang="en-US"/>
           </a:p>
@@ -1842,7 +1842,7 @@
           <a:p>
             <a:fld id="{E65F16E8-9810-4F67-B618-098E0E399057}" type="datetimeFigureOut">
               <a:rPr lang="en-US" smtClean="0"/>
-              <a:t>2/11/2025</a:t>
+              <a:t>2/12/2025</a:t>
             </a:fld>
             <a:endParaRPr lang="en-US"/>
           </a:p>
@@ -1937,7 +1937,7 @@
           <a:p>
             <a:fld id="{E65F16E8-9810-4F67-B618-098E0E399057}" type="datetimeFigureOut">
               <a:rPr lang="en-US" smtClean="0"/>
-              <a:t>2/11/2025</a:t>
+              <a:t>2/12/2025</a:t>
             </a:fld>
             <a:endParaRPr lang="en-US"/>
           </a:p>
@@ -2212,7 +2212,7 @@
           <a:p>
             <a:fld id="{E65F16E8-9810-4F67-B618-098E0E399057}" type="datetimeFigureOut">
               <a:rPr lang="en-US" smtClean="0"/>
-              <a:t>2/11/2025</a:t>
+              <a:t>2/12/2025</a:t>
             </a:fld>
             <a:endParaRPr lang="en-US"/>
           </a:p>
@@ -2464,7 +2464,7 @@
           <a:p>
             <a:fld id="{E65F16E8-9810-4F67-B618-098E0E399057}" type="datetimeFigureOut">
               <a:rPr lang="en-US" smtClean="0"/>
-              <a:t>2/11/2025</a:t>
+              <a:t>2/12/2025</a:t>
             </a:fld>
             <a:endParaRPr lang="en-US"/>
           </a:p>
@@ -2675,7 +2675,7 @@
           <a:p>
             <a:fld id="{E65F16E8-9810-4F67-B618-098E0E399057}" type="datetimeFigureOut">
               <a:rPr lang="en-US" smtClean="0"/>
-              <a:t>2/11/2025</a:t>
+              <a:t>2/12/2025</a:t>
             </a:fld>
             <a:endParaRPr lang="en-US"/>
           </a:p>
@@ -31562,8 +31562,8 @@
         </p:nvSpPr>
         <p:spPr>
           <a:xfrm rot="16200000">
-            <a:off x="4865528" y="4069731"/>
-            <a:ext cx="558165" cy="461665"/>
+            <a:off x="4879954" y="4069731"/>
+            <a:ext cx="529312" cy="461665"/>
           </a:xfrm>
           <a:prstGeom prst="rect">
             <a:avLst/>
@@ -31578,32 +31578,54 @@
           <a:p>
             <a:pPr algn="ctr"/>
             <a:r>
-              <a:rPr lang="en-US" sz="800" b="1" dirty="0">
+              <a:rPr lang="en-US" sz="800" b="1" dirty="0" smtClean="0">
                 <a:latin typeface="Century Gothic" panose="020B0502020202020204" pitchFamily="34" charset="0"/>
                 <a:cs typeface="Adobe Devanagari" panose="02040503050201020203" pitchFamily="18" charset="0"/>
               </a:rPr>
-              <a:t>Live</a:t>
-            </a:r>
-          </a:p>
-          <a:p>
-            <a:pPr algn="ctr"/>
-            <a:r>
-              <a:rPr lang="en-US" sz="800" b="1" dirty="0">
+              <a:t>Oct Up</a:t>
+            </a:r>
+          </a:p>
+          <a:p>
+            <a:pPr algn="ctr"/>
+            <a:r>
+              <a:rPr lang="en-US" sz="800" b="1" dirty="0" smtClean="0">
                 <a:latin typeface="Century Gothic" panose="020B0502020202020204" pitchFamily="34" charset="0"/>
                 <a:cs typeface="Adobe Devanagari" panose="02040503050201020203" pitchFamily="18" charset="0"/>
               </a:rPr>
-              <a:t>Sample</a:t>
-            </a:r>
-          </a:p>
-          <a:p>
-            <a:pPr algn="ctr"/>
-            <a:r>
-              <a:rPr lang="en-US" sz="800" b="1" dirty="0">
+              <a:t>Oct </a:t>
+            </a:r>
+            <a:r>
+              <a:rPr lang="en-US" sz="800" b="1" dirty="0" err="1" smtClean="0">
                 <a:latin typeface="Century Gothic" panose="020B0502020202020204" pitchFamily="34" charset="0"/>
                 <a:cs typeface="Adobe Devanagari" panose="02040503050201020203" pitchFamily="18" charset="0"/>
               </a:rPr>
-              <a:t>Dry</a:t>
-            </a:r>
+              <a:t>Dn</a:t>
+            </a:r>
+            <a:endParaRPr lang="en-US" sz="800" b="1" dirty="0" smtClean="0">
+              <a:latin typeface="Century Gothic" panose="020B0502020202020204" pitchFamily="34" charset="0"/>
+              <a:cs typeface="Adobe Devanagari" panose="02040503050201020203" pitchFamily="18" charset="0"/>
+            </a:endParaRPr>
+          </a:p>
+          <a:p>
+            <a:pPr algn="ctr"/>
+            <a:r>
+              <a:rPr lang="en-US" sz="800" b="1" dirty="0" smtClean="0">
+                <a:latin typeface="Century Gothic" panose="020B0502020202020204" pitchFamily="34" charset="0"/>
+                <a:cs typeface="Adobe Devanagari" panose="02040503050201020203" pitchFamily="18" charset="0"/>
+              </a:rPr>
+              <a:t>Up/</a:t>
+            </a:r>
+            <a:r>
+              <a:rPr lang="en-US" sz="800" b="1" dirty="0" err="1" smtClean="0">
+                <a:latin typeface="Century Gothic" panose="020B0502020202020204" pitchFamily="34" charset="0"/>
+                <a:cs typeface="Adobe Devanagari" panose="02040503050201020203" pitchFamily="18" charset="0"/>
+              </a:rPr>
+              <a:t>Dn</a:t>
+            </a:r>
+            <a:endParaRPr lang="en-US" sz="800" b="1" dirty="0">
+              <a:latin typeface="Century Gothic" panose="020B0502020202020204" pitchFamily="34" charset="0"/>
+              <a:cs typeface="Adobe Devanagari" panose="02040503050201020203" pitchFamily="18" charset="0"/>
+            </a:endParaRPr>
           </a:p>
         </p:txBody>
       </p:sp>
@@ -31897,11 +31919,62 @@
           <a:p>
             <a:pPr algn="ctr"/>
             <a:r>
+              <a:rPr lang="en-US" sz="800" b="1" dirty="0" smtClean="0">
+                <a:latin typeface="Century Gothic" panose="020B0502020202020204" pitchFamily="34" charset="0"/>
+                <a:cs typeface="Adobe Devanagari" panose="02040503050201020203" pitchFamily="18" charset="0"/>
+              </a:rPr>
+              <a:t>Slow At</a:t>
+            </a:r>
+            <a:endParaRPr lang="en-US" sz="800" b="1" dirty="0">
+              <a:latin typeface="Century Gothic" panose="020B0502020202020204" pitchFamily="34" charset="0"/>
+              <a:cs typeface="Adobe Devanagari" panose="02040503050201020203" pitchFamily="18" charset="0"/>
+            </a:endParaRPr>
+          </a:p>
+          <a:p>
+            <a:pPr algn="ctr"/>
+            <a:r>
+              <a:rPr lang="en-US" sz="800" b="1" dirty="0" smtClean="0">
+                <a:latin typeface="Century Gothic" panose="020B0502020202020204" pitchFamily="34" charset="0"/>
+                <a:cs typeface="Adobe Devanagari" panose="02040503050201020203" pitchFamily="18" charset="0"/>
+              </a:rPr>
+              <a:t>Fast At</a:t>
+            </a:r>
+            <a:endParaRPr lang="en-US" sz="800" b="1" dirty="0">
+              <a:latin typeface="Century Gothic" panose="020B0502020202020204" pitchFamily="34" charset="0"/>
+              <a:cs typeface="Adobe Devanagari" panose="02040503050201020203" pitchFamily="18" charset="0"/>
+            </a:endParaRPr>
+          </a:p>
+        </p:txBody>
+      </p:sp>
+      <p:sp>
+        <p:nvSpPr>
+          <p:cNvPr id="42" name="TextBox 41"/>
+          <p:cNvSpPr txBox="1"/>
+          <p:nvPr/>
+        </p:nvSpPr>
+        <p:spPr>
+          <a:xfrm rot="16200000">
+            <a:off x="6566837" y="4078069"/>
+            <a:ext cx="452368" cy="461665"/>
+          </a:xfrm>
+          <a:prstGeom prst="rect">
+            <a:avLst/>
+          </a:prstGeom>
+          <a:noFill/>
+        </p:spPr>
+        <p:txBody>
+          <a:bodyPr wrap="none" rtlCol="0">
+            <a:spAutoFit/>
+          </a:bodyPr>
+          <a:lstStyle/>
+          <a:p>
+            <a:pPr algn="ctr"/>
+            <a:r>
               <a:rPr lang="en-US" sz="800" b="1" dirty="0">
                 <a:latin typeface="Century Gothic" panose="020B0502020202020204" pitchFamily="34" charset="0"/>
                 <a:cs typeface="Adobe Devanagari" panose="02040503050201020203" pitchFamily="18" charset="0"/>
               </a:rPr>
-              <a:t>Wide</a:t>
+              <a:t>None</a:t>
             </a:r>
           </a:p>
           <a:p>
@@ -31911,21 +31984,31 @@
                 <a:latin typeface="Century Gothic" panose="020B0502020202020204" pitchFamily="34" charset="0"/>
                 <a:cs typeface="Adobe Devanagari" panose="02040503050201020203" pitchFamily="18" charset="0"/>
               </a:rPr>
-              <a:t>AR</a:t>
-            </a:r>
-          </a:p>
-        </p:txBody>
-      </p:sp>
-      <p:sp>
-        <p:nvSpPr>
-          <p:cNvPr id="42" name="TextBox 41"/>
+              <a:t>Gran</a:t>
+            </a:r>
+          </a:p>
+          <a:p>
+            <a:pPr algn="ctr"/>
+            <a:r>
+              <a:rPr lang="en-US" sz="800" b="1" dirty="0">
+                <a:latin typeface="Century Gothic" panose="020B0502020202020204" pitchFamily="34" charset="0"/>
+                <a:cs typeface="Adobe Devanagari" panose="02040503050201020203" pitchFamily="18" charset="0"/>
+              </a:rPr>
+              <a:t>FM</a:t>
+            </a:r>
+          </a:p>
+        </p:txBody>
+      </p:sp>
+      <p:sp>
+        <p:nvSpPr>
+          <p:cNvPr id="43" name="TextBox 42"/>
           <p:cNvSpPr txBox="1"/>
           <p:nvPr/>
         </p:nvSpPr>
         <p:spPr>
-          <a:xfrm rot="16200000">
-            <a:off x="6566837" y="4078069"/>
-            <a:ext cx="452368" cy="461665"/>
+          <a:xfrm>
+            <a:off x="4814940" y="3590760"/>
+            <a:ext cx="750526" cy="230832"/>
           </a:xfrm>
           <a:prstGeom prst="rect">
             <a:avLst/>
@@ -31940,64 +32023,18 @@
           <a:p>
             <a:pPr algn="ctr"/>
             <a:r>
-              <a:rPr lang="en-US" sz="800" b="1" dirty="0">
+              <a:rPr lang="en-US" sz="900" b="1" dirty="0" smtClean="0">
                 <a:latin typeface="Century Gothic" panose="020B0502020202020204" pitchFamily="34" charset="0"/>
                 <a:cs typeface="Adobe Devanagari" panose="02040503050201020203" pitchFamily="18" charset="0"/>
               </a:rPr>
-              <a:t>None</a:t>
-            </a:r>
-          </a:p>
-          <a:p>
-            <a:pPr algn="ctr"/>
-            <a:r>
-              <a:rPr lang="en-US" sz="800" b="1" dirty="0">
-                <a:latin typeface="Century Gothic" panose="020B0502020202020204" pitchFamily="34" charset="0"/>
-                <a:cs typeface="Adobe Devanagari" panose="02040503050201020203" pitchFamily="18" charset="0"/>
-              </a:rPr>
-              <a:t>Gran</a:t>
-            </a:r>
-          </a:p>
-          <a:p>
-            <a:pPr algn="ctr"/>
-            <a:r>
-              <a:rPr lang="en-US" sz="800" b="1" dirty="0">
-                <a:latin typeface="Century Gothic" panose="020B0502020202020204" pitchFamily="34" charset="0"/>
-                <a:cs typeface="Adobe Devanagari" panose="02040503050201020203" pitchFamily="18" charset="0"/>
-              </a:rPr>
-              <a:t>FM</a:t>
-            </a:r>
-          </a:p>
-        </p:txBody>
-      </p:sp>
-      <p:sp>
-        <p:nvSpPr>
-          <p:cNvPr id="43" name="TextBox 42"/>
-          <p:cNvSpPr txBox="1"/>
-          <p:nvPr/>
-        </p:nvSpPr>
-        <p:spPr>
-          <a:xfrm>
-            <a:off x="4705936" y="3590760"/>
-            <a:ext cx="968535" cy="230832"/>
-          </a:xfrm>
-          <a:prstGeom prst="rect">
-            <a:avLst/>
-          </a:prstGeom>
-          <a:noFill/>
-        </p:spPr>
-        <p:txBody>
-          <a:bodyPr wrap="none" rtlCol="0">
-            <a:spAutoFit/>
-          </a:bodyPr>
-          <a:lstStyle/>
-          <a:p>
-            <a:pPr algn="ctr"/>
+              <a:t>Oct </a:t>
+            </a:r>
             <a:r>
               <a:rPr lang="en-US" sz="900" b="1" dirty="0">
                 <a:latin typeface="Century Gothic" panose="020B0502020202020204" pitchFamily="34" charset="0"/>
                 <a:cs typeface="Adobe Devanagari" panose="02040503050201020203" pitchFamily="18" charset="0"/>
               </a:rPr>
-              <a:t>Sample Mode</a:t>
+              <a:t>Mode</a:t>
             </a:r>
           </a:p>
         </p:txBody>
@@ -32451,23 +32488,7 @@
                   <a:schemeClr val="bg1"/>
                 </a:solidFill>
               </a:rPr>
-              <a:t>  Right</a:t>
-            </a:r>
-            <a:r>
-              <a:rPr lang="en-US" sz="1600" b="1">
-                <a:solidFill>
-                  <a:schemeClr val="bg1"/>
-                </a:solidFill>
-              </a:rPr>
-              <a:t>: Fast </a:t>
-            </a:r>
-            <a:r>
-              <a:rPr lang="en-US" sz="1600" b="1" dirty="0">
-                <a:solidFill>
-                  <a:schemeClr val="bg1"/>
-                </a:solidFill>
-              </a:rPr>
-              <a:t>attack-release linear</a:t>
+              <a:t>  Right: Fast attack-release linear</a:t>
             </a:r>
           </a:p>
         </p:txBody>

</xml_diff>